<commit_message>
gui:  - fixing name on animation menu from main window  - getting rid of duplicate window loader (that also fixes duplicate creating two separate animation windows)
</commit_message>
<xml_diff>
--- a/pyNastran/gui/icons/pics.pptx
+++ b/pyNastran/gui/icons/pics.pptx
@@ -260,7 +260,7 @@
           <a:p>
             <a:fld id="{E392C192-A0AD-4860-9CF5-58BF5FDD6DBB}" type="datetimeFigureOut">
               <a:rPr lang="en-US" smtClean="0"/>
-              <a:t>6/3/2018</a:t>
+              <a:t>6/4/2018</a:t>
             </a:fld>
             <a:endParaRPr lang="en-US"/>
           </a:p>
@@ -458,7 +458,7 @@
           <a:p>
             <a:fld id="{E392C192-A0AD-4860-9CF5-58BF5FDD6DBB}" type="datetimeFigureOut">
               <a:rPr lang="en-US" smtClean="0"/>
-              <a:t>6/3/2018</a:t>
+              <a:t>6/4/2018</a:t>
             </a:fld>
             <a:endParaRPr lang="en-US"/>
           </a:p>
@@ -666,7 +666,7 @@
           <a:p>
             <a:fld id="{E392C192-A0AD-4860-9CF5-58BF5FDD6DBB}" type="datetimeFigureOut">
               <a:rPr lang="en-US" smtClean="0"/>
-              <a:t>6/3/2018</a:t>
+              <a:t>6/4/2018</a:t>
             </a:fld>
             <a:endParaRPr lang="en-US"/>
           </a:p>
@@ -864,7 +864,7 @@
           <a:p>
             <a:fld id="{E392C192-A0AD-4860-9CF5-58BF5FDD6DBB}" type="datetimeFigureOut">
               <a:rPr lang="en-US" smtClean="0"/>
-              <a:t>6/3/2018</a:t>
+              <a:t>6/4/2018</a:t>
             </a:fld>
             <a:endParaRPr lang="en-US"/>
           </a:p>
@@ -1139,7 +1139,7 @@
           <a:p>
             <a:fld id="{E392C192-A0AD-4860-9CF5-58BF5FDD6DBB}" type="datetimeFigureOut">
               <a:rPr lang="en-US" smtClean="0"/>
-              <a:t>6/3/2018</a:t>
+              <a:t>6/4/2018</a:t>
             </a:fld>
             <a:endParaRPr lang="en-US"/>
           </a:p>
@@ -1404,7 +1404,7 @@
           <a:p>
             <a:fld id="{E392C192-A0AD-4860-9CF5-58BF5FDD6DBB}" type="datetimeFigureOut">
               <a:rPr lang="en-US" smtClean="0"/>
-              <a:t>6/3/2018</a:t>
+              <a:t>6/4/2018</a:t>
             </a:fld>
             <a:endParaRPr lang="en-US"/>
           </a:p>
@@ -1816,7 +1816,7 @@
           <a:p>
             <a:fld id="{E392C192-A0AD-4860-9CF5-58BF5FDD6DBB}" type="datetimeFigureOut">
               <a:rPr lang="en-US" smtClean="0"/>
-              <a:t>6/3/2018</a:t>
+              <a:t>6/4/2018</a:t>
             </a:fld>
             <a:endParaRPr lang="en-US"/>
           </a:p>
@@ -1957,7 +1957,7 @@
           <a:p>
             <a:fld id="{E392C192-A0AD-4860-9CF5-58BF5FDD6DBB}" type="datetimeFigureOut">
               <a:rPr lang="en-US" smtClean="0"/>
-              <a:t>6/3/2018</a:t>
+              <a:t>6/4/2018</a:t>
             </a:fld>
             <a:endParaRPr lang="en-US"/>
           </a:p>
@@ -2070,7 +2070,7 @@
           <a:p>
             <a:fld id="{E392C192-A0AD-4860-9CF5-58BF5FDD6DBB}" type="datetimeFigureOut">
               <a:rPr lang="en-US" smtClean="0"/>
-              <a:t>6/3/2018</a:t>
+              <a:t>6/4/2018</a:t>
             </a:fld>
             <a:endParaRPr lang="en-US"/>
           </a:p>
@@ -2381,7 +2381,7 @@
           <a:p>
             <a:fld id="{E392C192-A0AD-4860-9CF5-58BF5FDD6DBB}" type="datetimeFigureOut">
               <a:rPr lang="en-US" smtClean="0"/>
-              <a:t>6/3/2018</a:t>
+              <a:t>6/4/2018</a:t>
             </a:fld>
             <a:endParaRPr lang="en-US"/>
           </a:p>
@@ -2669,7 +2669,7 @@
           <a:p>
             <a:fld id="{E392C192-A0AD-4860-9CF5-58BF5FDD6DBB}" type="datetimeFigureOut">
               <a:rPr lang="en-US" smtClean="0"/>
-              <a:t>6/3/2018</a:t>
+              <a:t>6/4/2018</a:t>
             </a:fld>
             <a:endParaRPr lang="en-US"/>
           </a:p>
@@ -2910,7 +2910,7 @@
           <a:p>
             <a:fld id="{E392C192-A0AD-4860-9CF5-58BF5FDD6DBB}" type="datetimeFigureOut">
               <a:rPr lang="en-US" smtClean="0"/>
-              <a:t>6/3/2018</a:t>
+              <a:t>6/4/2018</a:t>
             </a:fld>
             <a:endParaRPr lang="en-US"/>
           </a:p>
@@ -3671,6 +3671,42 @@
           </a:p>
         </p:txBody>
       </p:sp>
+      <p:pic>
+        <p:nvPicPr>
+          <p:cNvPr id="9" name="Picture 8">
+            <a:extLst>
+              <a:ext uri="{FF2B5EF4-FFF2-40B4-BE49-F238E27FC236}">
+                <a16:creationId xmlns:a16="http://schemas.microsoft.com/office/drawing/2014/main" id="{C8E9C957-089C-4260-A4CF-3FB3F07D2547}"/>
+              </a:ext>
+            </a:extLst>
+          </p:cNvPr>
+          <p:cNvPicPr>
+            <a:picLocks noChangeAspect="1"/>
+          </p:cNvPicPr>
+          <p:nvPr/>
+        </p:nvPicPr>
+        <p:blipFill>
+          <a:blip r:embed="rId2">
+            <a:extLst>
+              <a:ext uri="{28A0092B-C50C-407E-A947-70E740481C1C}">
+                <a14:useLocalDpi xmlns:a14="http://schemas.microsoft.com/office/drawing/2010/main" val="0"/>
+              </a:ext>
+            </a:extLst>
+          </a:blip>
+          <a:stretch>
+            <a:fillRect/>
+          </a:stretch>
+        </p:blipFill>
+        <p:spPr>
+          <a:xfrm>
+            <a:off x="1366445" y="918455"/>
+            <a:ext cx="1066949" cy="1038370"/>
+          </a:xfrm>
+          <a:prstGeom prst="rect">
+            <a:avLst/>
+          </a:prstGeom>
+        </p:spPr>
+      </p:pic>
     </p:spTree>
     <p:extLst>
       <p:ext uri="{BB962C8B-B14F-4D97-AF65-F5344CB8AC3E}">
@@ -3701,6 +3737,53 @@
           <a:chExt cx="0" cy="0"/>
         </a:xfrm>
       </p:grpSpPr>
+      <p:sp>
+        <p:nvSpPr>
+          <p:cNvPr id="2" name="Rectangle 1">
+            <a:extLst>
+              <a:ext uri="{FF2B5EF4-FFF2-40B4-BE49-F238E27FC236}">
+                <a16:creationId xmlns:a16="http://schemas.microsoft.com/office/drawing/2014/main" id="{64A1EAD4-388C-45BF-8410-3F741C903669}"/>
+              </a:ext>
+            </a:extLst>
+          </p:cNvPr>
+          <p:cNvSpPr/>
+          <p:nvPr/>
+        </p:nvSpPr>
+        <p:spPr>
+          <a:xfrm>
+            <a:off x="2725786" y="3696368"/>
+            <a:ext cx="2098766" cy="2042549"/>
+          </a:xfrm>
+          <a:prstGeom prst="rect">
+            <a:avLst/>
+          </a:prstGeom>
+          <a:noFill/>
+        </p:spPr>
+        <p:style>
+          <a:lnRef idx="2">
+            <a:schemeClr val="accent1">
+              <a:shade val="50000"/>
+            </a:schemeClr>
+          </a:lnRef>
+          <a:fillRef idx="1">
+            <a:schemeClr val="accent1"/>
+          </a:fillRef>
+          <a:effectRef idx="0">
+            <a:schemeClr val="accent1"/>
+          </a:effectRef>
+          <a:fontRef idx="minor">
+            <a:schemeClr val="lt1"/>
+          </a:fontRef>
+        </p:style>
+        <p:txBody>
+          <a:bodyPr rtlCol="0" anchor="ctr"/>
+          <a:lstStyle/>
+          <a:p>
+            <a:pPr algn="ctr"/>
+            <a:endParaRPr lang="en-US"/>
+          </a:p>
+        </p:txBody>
+      </p:sp>
       <p:sp>
         <p:nvSpPr>
           <p:cNvPr id="4" name="TextBox 3">
@@ -4317,8 +4400,8 @@
         </p:nvGrpSpPr>
         <p:grpSpPr>
           <a:xfrm>
-            <a:off x="6322423" y="4373655"/>
-            <a:ext cx="2098766" cy="1254033"/>
+            <a:off x="2725786" y="3801689"/>
+            <a:ext cx="2098766" cy="2361116"/>
             <a:chOff x="6322423" y="2203269"/>
             <a:chExt cx="2098766" cy="1254033"/>
           </a:xfrm>
@@ -4515,6 +4598,381 @@
               <a:extLst>
                 <a:ext uri="{FF2B5EF4-FFF2-40B4-BE49-F238E27FC236}">
                   <a16:creationId xmlns:a16="http://schemas.microsoft.com/office/drawing/2014/main" id="{6F0D928B-4439-483E-A887-0536E23D1C9D}"/>
+                </a:ext>
+              </a:extLst>
+            </p:cNvPr>
+            <p:cNvSpPr/>
+            <p:nvPr/>
+          </p:nvSpPr>
+          <p:spPr>
+            <a:xfrm>
+              <a:off x="7367449" y="2991393"/>
+              <a:ext cx="783772" cy="465909"/>
+            </a:xfrm>
+            <a:prstGeom prst="arc">
+              <a:avLst/>
+            </a:prstGeom>
+            <a:ln w="31750">
+              <a:solidFill>
+                <a:srgbClr val="FF0000"/>
+              </a:solidFill>
+            </a:ln>
+          </p:spPr>
+          <p:style>
+            <a:lnRef idx="1">
+              <a:schemeClr val="accent1"/>
+            </a:lnRef>
+            <a:fillRef idx="0">
+              <a:schemeClr val="accent1"/>
+            </a:fillRef>
+            <a:effectRef idx="0">
+              <a:schemeClr val="accent1"/>
+            </a:effectRef>
+            <a:fontRef idx="minor">
+              <a:schemeClr val="tx1"/>
+            </a:fontRef>
+          </p:style>
+          <p:txBody>
+            <a:bodyPr rtlCol="0" anchor="ctr"/>
+            <a:lstStyle/>
+            <a:p>
+              <a:pPr algn="ctr"/>
+              <a:endParaRPr lang="en-US"/>
+            </a:p>
+          </p:txBody>
+        </p:sp>
+      </p:grpSp>
+      <p:pic>
+        <p:nvPicPr>
+          <p:cNvPr id="17" name="Picture 16">
+            <a:extLst>
+              <a:ext uri="{FF2B5EF4-FFF2-40B4-BE49-F238E27FC236}">
+                <a16:creationId xmlns:a16="http://schemas.microsoft.com/office/drawing/2014/main" id="{ED605502-D6FB-4B87-824F-E313DDCB5A33}"/>
+              </a:ext>
+            </a:extLst>
+          </p:cNvPr>
+          <p:cNvPicPr>
+            <a:picLocks noChangeAspect="1"/>
+          </p:cNvPicPr>
+          <p:nvPr/>
+        </p:nvPicPr>
+        <p:blipFill>
+          <a:blip r:embed="rId2">
+            <a:extLst>
+              <a:ext uri="{28A0092B-C50C-407E-A947-70E740481C1C}">
+                <a14:useLocalDpi xmlns:a14="http://schemas.microsoft.com/office/drawing/2010/main" val="0"/>
+              </a:ext>
+            </a:extLst>
+          </a:blip>
+          <a:stretch>
+            <a:fillRect/>
+          </a:stretch>
+        </p:blipFill>
+        <p:spPr>
+          <a:xfrm>
+            <a:off x="9945188" y="160720"/>
+            <a:ext cx="2098766" cy="2042549"/>
+          </a:xfrm>
+          <a:prstGeom prst="rect">
+            <a:avLst/>
+          </a:prstGeom>
+        </p:spPr>
+      </p:pic>
+      <p:pic>
+        <p:nvPicPr>
+          <p:cNvPr id="18" name="Picture 17">
+            <a:extLst>
+              <a:ext uri="{FF2B5EF4-FFF2-40B4-BE49-F238E27FC236}">
+                <a16:creationId xmlns:a16="http://schemas.microsoft.com/office/drawing/2014/main" id="{748CB62D-30EE-4356-A82B-FF8629CE782D}"/>
+              </a:ext>
+            </a:extLst>
+          </p:cNvPr>
+          <p:cNvPicPr>
+            <a:picLocks noChangeAspect="1"/>
+          </p:cNvPicPr>
+          <p:nvPr/>
+        </p:nvPicPr>
+        <p:blipFill>
+          <a:blip r:embed="rId2">
+            <a:extLst>
+              <a:ext uri="{28A0092B-C50C-407E-A947-70E740481C1C}">
+                <a14:useLocalDpi xmlns:a14="http://schemas.microsoft.com/office/drawing/2010/main" val="0"/>
+              </a:ext>
+            </a:extLst>
+          </a:blip>
+          <a:stretch>
+            <a:fillRect/>
+          </a:stretch>
+        </p:blipFill>
+        <p:spPr>
+          <a:xfrm>
+            <a:off x="866502" y="4840941"/>
+            <a:ext cx="1066949" cy="1038370"/>
+          </a:xfrm>
+          <a:prstGeom prst="rect">
+            <a:avLst/>
+          </a:prstGeom>
+        </p:spPr>
+      </p:pic>
+      <p:sp>
+        <p:nvSpPr>
+          <p:cNvPr id="19" name="Rectangle 18">
+            <a:extLst>
+              <a:ext uri="{FF2B5EF4-FFF2-40B4-BE49-F238E27FC236}">
+                <a16:creationId xmlns:a16="http://schemas.microsoft.com/office/drawing/2014/main" id="{572F053F-EECA-4E7E-B6DA-47058E29180A}"/>
+              </a:ext>
+            </a:extLst>
+          </p:cNvPr>
+          <p:cNvSpPr/>
+          <p:nvPr/>
+        </p:nvSpPr>
+        <p:spPr>
+          <a:xfrm>
+            <a:off x="866503" y="3698097"/>
+            <a:ext cx="1066949" cy="1038370"/>
+          </a:xfrm>
+          <a:prstGeom prst="rect">
+            <a:avLst/>
+          </a:prstGeom>
+          <a:noFill/>
+        </p:spPr>
+        <p:style>
+          <a:lnRef idx="2">
+            <a:schemeClr val="accent1">
+              <a:shade val="50000"/>
+            </a:schemeClr>
+          </a:lnRef>
+          <a:fillRef idx="1">
+            <a:schemeClr val="accent1"/>
+          </a:fillRef>
+          <a:effectRef idx="0">
+            <a:schemeClr val="accent1"/>
+          </a:effectRef>
+          <a:fontRef idx="minor">
+            <a:schemeClr val="lt1"/>
+          </a:fontRef>
+        </p:style>
+        <p:txBody>
+          <a:bodyPr rtlCol="0" anchor="ctr"/>
+          <a:lstStyle/>
+          <a:p>
+            <a:pPr algn="ctr"/>
+            <a:endParaRPr lang="en-US"/>
+          </a:p>
+        </p:txBody>
+      </p:sp>
+      <p:grpSp>
+        <p:nvGrpSpPr>
+          <p:cNvPr id="20" name="Group 19">
+            <a:extLst>
+              <a:ext uri="{FF2B5EF4-FFF2-40B4-BE49-F238E27FC236}">
+                <a16:creationId xmlns:a16="http://schemas.microsoft.com/office/drawing/2014/main" id="{F67A061D-EBFF-47A1-B1E0-B62FE80E253A}"/>
+              </a:ext>
+            </a:extLst>
+          </p:cNvPr>
+          <p:cNvGrpSpPr/>
+          <p:nvPr/>
+        </p:nvGrpSpPr>
+        <p:grpSpPr>
+          <a:xfrm>
+            <a:off x="866502" y="3696367"/>
+            <a:ext cx="1066949" cy="1288867"/>
+            <a:chOff x="6322423" y="2203269"/>
+            <a:chExt cx="2098766" cy="1254033"/>
+          </a:xfrm>
+        </p:grpSpPr>
+        <p:sp>
+          <p:nvSpPr>
+            <p:cNvPr id="21" name="Freeform: Shape 20">
+              <a:extLst>
+                <a:ext uri="{FF2B5EF4-FFF2-40B4-BE49-F238E27FC236}">
+                  <a16:creationId xmlns:a16="http://schemas.microsoft.com/office/drawing/2014/main" id="{4D45180C-EE4D-4CB1-914B-A70CE3414966}"/>
+                </a:ext>
+              </a:extLst>
+            </p:cNvPr>
+            <p:cNvSpPr/>
+            <p:nvPr/>
+          </p:nvSpPr>
+          <p:spPr>
+            <a:xfrm>
+              <a:off x="6322423" y="2203269"/>
+              <a:ext cx="2098766" cy="687977"/>
+            </a:xfrm>
+            <a:custGeom>
+              <a:avLst/>
+              <a:gdLst>
+                <a:gd name="connsiteX0" fmla="*/ 0 w 2098766"/>
+                <a:gd name="connsiteY0" fmla="*/ 0 h 687977"/>
+                <a:gd name="connsiteX1" fmla="*/ 8708 w 2098766"/>
+                <a:gd name="connsiteY1" fmla="*/ 348342 h 687977"/>
+                <a:gd name="connsiteX2" fmla="*/ 574766 w 2098766"/>
+                <a:gd name="connsiteY2" fmla="*/ 357051 h 687977"/>
+                <a:gd name="connsiteX3" fmla="*/ 1463040 w 2098766"/>
+                <a:gd name="connsiteY3" fmla="*/ 478971 h 687977"/>
+                <a:gd name="connsiteX4" fmla="*/ 2098766 w 2098766"/>
+                <a:gd name="connsiteY4" fmla="*/ 687977 h 687977"/>
+                <a:gd name="connsiteX5" fmla="*/ 2098766 w 2098766"/>
+                <a:gd name="connsiteY5" fmla="*/ 365760 h 687977"/>
+                <a:gd name="connsiteX6" fmla="*/ 1637211 w 2098766"/>
+                <a:gd name="connsiteY6" fmla="*/ 182880 h 687977"/>
+                <a:gd name="connsiteX7" fmla="*/ 975360 w 2098766"/>
+                <a:gd name="connsiteY7" fmla="*/ 52251 h 687977"/>
+                <a:gd name="connsiteX8" fmla="*/ 444137 w 2098766"/>
+                <a:gd name="connsiteY8" fmla="*/ 34834 h 687977"/>
+                <a:gd name="connsiteX9" fmla="*/ 0 w 2098766"/>
+                <a:gd name="connsiteY9" fmla="*/ 0 h 687977"/>
+              </a:gdLst>
+              <a:ahLst/>
+              <a:cxnLst>
+                <a:cxn ang="0">
+                  <a:pos x="connsiteX0" y="connsiteY0"/>
+                </a:cxn>
+                <a:cxn ang="0">
+                  <a:pos x="connsiteX1" y="connsiteY1"/>
+                </a:cxn>
+                <a:cxn ang="0">
+                  <a:pos x="connsiteX2" y="connsiteY2"/>
+                </a:cxn>
+                <a:cxn ang="0">
+                  <a:pos x="connsiteX3" y="connsiteY3"/>
+                </a:cxn>
+                <a:cxn ang="0">
+                  <a:pos x="connsiteX4" y="connsiteY4"/>
+                </a:cxn>
+                <a:cxn ang="0">
+                  <a:pos x="connsiteX5" y="connsiteY5"/>
+                </a:cxn>
+                <a:cxn ang="0">
+                  <a:pos x="connsiteX6" y="connsiteY6"/>
+                </a:cxn>
+                <a:cxn ang="0">
+                  <a:pos x="connsiteX7" y="connsiteY7"/>
+                </a:cxn>
+                <a:cxn ang="0">
+                  <a:pos x="connsiteX8" y="connsiteY8"/>
+                </a:cxn>
+                <a:cxn ang="0">
+                  <a:pos x="connsiteX9" y="connsiteY9"/>
+                </a:cxn>
+              </a:cxnLst>
+              <a:rect l="l" t="t" r="r" b="b"/>
+              <a:pathLst>
+                <a:path w="2098766" h="687977">
+                  <a:moveTo>
+                    <a:pt x="0" y="0"/>
+                  </a:moveTo>
+                  <a:lnTo>
+                    <a:pt x="8708" y="348342"/>
+                  </a:lnTo>
+                  <a:lnTo>
+                    <a:pt x="574766" y="357051"/>
+                  </a:lnTo>
+                  <a:lnTo>
+                    <a:pt x="1463040" y="478971"/>
+                  </a:lnTo>
+                  <a:lnTo>
+                    <a:pt x="2098766" y="687977"/>
+                  </a:lnTo>
+                  <a:lnTo>
+                    <a:pt x="2098766" y="365760"/>
+                  </a:lnTo>
+                  <a:lnTo>
+                    <a:pt x="1637211" y="182880"/>
+                  </a:lnTo>
+                  <a:lnTo>
+                    <a:pt x="975360" y="52251"/>
+                  </a:lnTo>
+                  <a:lnTo>
+                    <a:pt x="444137" y="34834"/>
+                  </a:lnTo>
+                  <a:lnTo>
+                    <a:pt x="0" y="0"/>
+                  </a:lnTo>
+                  <a:close/>
+                </a:path>
+              </a:pathLst>
+            </a:custGeom>
+          </p:spPr>
+          <p:style>
+            <a:lnRef idx="2">
+              <a:schemeClr val="accent1">
+                <a:shade val="50000"/>
+              </a:schemeClr>
+            </a:lnRef>
+            <a:fillRef idx="1">
+              <a:schemeClr val="accent1"/>
+            </a:fillRef>
+            <a:effectRef idx="0">
+              <a:schemeClr val="accent1"/>
+            </a:effectRef>
+            <a:fontRef idx="minor">
+              <a:schemeClr val="lt1"/>
+            </a:fontRef>
+          </p:style>
+          <p:txBody>
+            <a:bodyPr rtlCol="0" anchor="ctr"/>
+            <a:lstStyle/>
+            <a:p>
+              <a:pPr algn="ctr"/>
+              <a:endParaRPr lang="en-US"/>
+            </a:p>
+          </p:txBody>
+        </p:sp>
+        <p:sp>
+          <p:nvSpPr>
+            <p:cNvPr id="22" name="Arc 21">
+              <a:extLst>
+                <a:ext uri="{FF2B5EF4-FFF2-40B4-BE49-F238E27FC236}">
+                  <a16:creationId xmlns:a16="http://schemas.microsoft.com/office/drawing/2014/main" id="{610D60E0-42C5-427A-99DF-C57BED1E1E75}"/>
+                </a:ext>
+              </a:extLst>
+            </p:cNvPr>
+            <p:cNvSpPr/>
+            <p:nvPr/>
+          </p:nvSpPr>
+          <p:spPr>
+            <a:xfrm>
+              <a:off x="7502433" y="2876005"/>
+              <a:ext cx="783772" cy="465909"/>
+            </a:xfrm>
+            <a:prstGeom prst="arc">
+              <a:avLst/>
+            </a:prstGeom>
+            <a:ln w="31750">
+              <a:solidFill>
+                <a:srgbClr val="FF0000"/>
+              </a:solidFill>
+            </a:ln>
+          </p:spPr>
+          <p:style>
+            <a:lnRef idx="1">
+              <a:schemeClr val="accent1"/>
+            </a:lnRef>
+            <a:fillRef idx="0">
+              <a:schemeClr val="accent1"/>
+            </a:fillRef>
+            <a:effectRef idx="0">
+              <a:schemeClr val="accent1"/>
+            </a:effectRef>
+            <a:fontRef idx="minor">
+              <a:schemeClr val="tx1"/>
+            </a:fontRef>
+          </p:style>
+          <p:txBody>
+            <a:bodyPr rtlCol="0" anchor="ctr"/>
+            <a:lstStyle/>
+            <a:p>
+              <a:pPr algn="ctr"/>
+              <a:endParaRPr lang="en-US"/>
+            </a:p>
+          </p:txBody>
+        </p:sp>
+        <p:sp>
+          <p:nvSpPr>
+            <p:cNvPr id="23" name="Arc 22">
+              <a:extLst>
+                <a:ext uri="{FF2B5EF4-FFF2-40B4-BE49-F238E27FC236}">
+                  <a16:creationId xmlns:a16="http://schemas.microsoft.com/office/drawing/2014/main" id="{D45D1E75-A0D4-4766-BB7F-73BC5618ECA7}"/>
                 </a:ext>
               </a:extLst>
             </p:cNvPr>

</xml_diff>

<commit_message>
bdf:  - adding GENEL  - optimization cleanup  - hdf5: handling Nones in reject cards
f06:
 - fixing flutter tests
</commit_message>
<xml_diff>
--- a/pyNastran/gui/icons/pics.pptx
+++ b/pyNastran/gui/icons/pics.pptx
@@ -7,6 +7,7 @@
   <p:sldIdLst>
     <p:sldId id="256" r:id="rId2"/>
     <p:sldId id="257" r:id="rId3"/>
+    <p:sldId id="258" r:id="rId4"/>
   </p:sldIdLst>
   <p:sldSz cx="12192000" cy="6858000"/>
   <p:notesSz cx="6858000" cy="9144000"/>
@@ -260,7 +261,7 @@
           <a:p>
             <a:fld id="{E392C192-A0AD-4860-9CF5-58BF5FDD6DBB}" type="datetimeFigureOut">
               <a:rPr lang="en-US" smtClean="0"/>
-              <a:t>6/4/2018</a:t>
+              <a:t>11/10/2018</a:t>
             </a:fld>
             <a:endParaRPr lang="en-US"/>
           </a:p>
@@ -458,7 +459,7 @@
           <a:p>
             <a:fld id="{E392C192-A0AD-4860-9CF5-58BF5FDD6DBB}" type="datetimeFigureOut">
               <a:rPr lang="en-US" smtClean="0"/>
-              <a:t>6/4/2018</a:t>
+              <a:t>11/10/2018</a:t>
             </a:fld>
             <a:endParaRPr lang="en-US"/>
           </a:p>
@@ -666,7 +667,7 @@
           <a:p>
             <a:fld id="{E392C192-A0AD-4860-9CF5-58BF5FDD6DBB}" type="datetimeFigureOut">
               <a:rPr lang="en-US" smtClean="0"/>
-              <a:t>6/4/2018</a:t>
+              <a:t>11/10/2018</a:t>
             </a:fld>
             <a:endParaRPr lang="en-US"/>
           </a:p>
@@ -864,7 +865,7 @@
           <a:p>
             <a:fld id="{E392C192-A0AD-4860-9CF5-58BF5FDD6DBB}" type="datetimeFigureOut">
               <a:rPr lang="en-US" smtClean="0"/>
-              <a:t>6/4/2018</a:t>
+              <a:t>11/10/2018</a:t>
             </a:fld>
             <a:endParaRPr lang="en-US"/>
           </a:p>
@@ -1139,7 +1140,7 @@
           <a:p>
             <a:fld id="{E392C192-A0AD-4860-9CF5-58BF5FDD6DBB}" type="datetimeFigureOut">
               <a:rPr lang="en-US" smtClean="0"/>
-              <a:t>6/4/2018</a:t>
+              <a:t>11/10/2018</a:t>
             </a:fld>
             <a:endParaRPr lang="en-US"/>
           </a:p>
@@ -1404,7 +1405,7 @@
           <a:p>
             <a:fld id="{E392C192-A0AD-4860-9CF5-58BF5FDD6DBB}" type="datetimeFigureOut">
               <a:rPr lang="en-US" smtClean="0"/>
-              <a:t>6/4/2018</a:t>
+              <a:t>11/10/2018</a:t>
             </a:fld>
             <a:endParaRPr lang="en-US"/>
           </a:p>
@@ -1816,7 +1817,7 @@
           <a:p>
             <a:fld id="{E392C192-A0AD-4860-9CF5-58BF5FDD6DBB}" type="datetimeFigureOut">
               <a:rPr lang="en-US" smtClean="0"/>
-              <a:t>6/4/2018</a:t>
+              <a:t>11/10/2018</a:t>
             </a:fld>
             <a:endParaRPr lang="en-US"/>
           </a:p>
@@ -1957,7 +1958,7 @@
           <a:p>
             <a:fld id="{E392C192-A0AD-4860-9CF5-58BF5FDD6DBB}" type="datetimeFigureOut">
               <a:rPr lang="en-US" smtClean="0"/>
-              <a:t>6/4/2018</a:t>
+              <a:t>11/10/2018</a:t>
             </a:fld>
             <a:endParaRPr lang="en-US"/>
           </a:p>
@@ -2070,7 +2071,7 @@
           <a:p>
             <a:fld id="{E392C192-A0AD-4860-9CF5-58BF5FDD6DBB}" type="datetimeFigureOut">
               <a:rPr lang="en-US" smtClean="0"/>
-              <a:t>6/4/2018</a:t>
+              <a:t>11/10/2018</a:t>
             </a:fld>
             <a:endParaRPr lang="en-US"/>
           </a:p>
@@ -2381,7 +2382,7 @@
           <a:p>
             <a:fld id="{E392C192-A0AD-4860-9CF5-58BF5FDD6DBB}" type="datetimeFigureOut">
               <a:rPr lang="en-US" smtClean="0"/>
-              <a:t>6/4/2018</a:t>
+              <a:t>11/10/2018</a:t>
             </a:fld>
             <a:endParaRPr lang="en-US"/>
           </a:p>
@@ -2669,7 +2670,7 @@
           <a:p>
             <a:fld id="{E392C192-A0AD-4860-9CF5-58BF5FDD6DBB}" type="datetimeFigureOut">
               <a:rPr lang="en-US" smtClean="0"/>
-              <a:t>6/4/2018</a:t>
+              <a:t>11/10/2018</a:t>
             </a:fld>
             <a:endParaRPr lang="en-US"/>
           </a:p>
@@ -2910,7 +2911,7 @@
           <a:p>
             <a:fld id="{E392C192-A0AD-4860-9CF5-58BF5FDD6DBB}" type="datetimeFigureOut">
               <a:rPr lang="en-US" smtClean="0"/>
-              <a:t>6/4/2018</a:t>
+              <a:t>11/10/2018</a:t>
             </a:fld>
             <a:endParaRPr lang="en-US"/>
           </a:p>
@@ -5030,6 +5031,310 @@
 </p:sld>
 </file>
 
+<file path=ppt/slides/slide3.xml><?xml version="1.0" encoding="utf-8"?>
+<p:sld xmlns:a="http://schemas.openxmlformats.org/drawingml/2006/main" xmlns:r="http://schemas.openxmlformats.org/officeDocument/2006/relationships" xmlns:p="http://schemas.openxmlformats.org/presentationml/2006/main">
+  <p:cSld>
+    <p:spTree>
+      <p:nvGrpSpPr>
+        <p:cNvPr id="1" name=""/>
+        <p:cNvGrpSpPr/>
+        <p:nvPr/>
+      </p:nvGrpSpPr>
+      <p:grpSpPr>
+        <a:xfrm>
+          <a:off x="0" y="0"/>
+          <a:ext cx="0" cy="0"/>
+          <a:chOff x="0" y="0"/>
+          <a:chExt cx="0" cy="0"/>
+        </a:xfrm>
+      </p:grpSpPr>
+      <p:sp>
+        <p:nvSpPr>
+          <p:cNvPr id="4" name="AutoShape 2" descr="Image result for anchor">
+            <a:extLst>
+              <a:ext uri="{FF2B5EF4-FFF2-40B4-BE49-F238E27FC236}">
+                <a16:creationId xmlns:a16="http://schemas.microsoft.com/office/drawing/2014/main" id="{7F3D8A6A-A165-4D47-B5E8-91397E334B4F}"/>
+              </a:ext>
+            </a:extLst>
+          </p:cNvPr>
+          <p:cNvSpPr>
+            <a:spLocks noChangeAspect="1" noChangeArrowheads="1"/>
+          </p:cNvSpPr>
+          <p:nvPr/>
+        </p:nvSpPr>
+        <p:spPr bwMode="auto">
+          <a:xfrm>
+            <a:off x="4129089" y="647700"/>
+            <a:ext cx="2123666" cy="382657"/>
+          </a:xfrm>
+          <a:prstGeom prst="rect">
+            <a:avLst/>
+          </a:prstGeom>
+          <a:noFill/>
+          <a:extLst>
+            <a:ext uri="{909E8E84-426E-40DD-AFC4-6F175D3DCCD1}">
+              <a14:hiddenFill xmlns:a14="http://schemas.microsoft.com/office/drawing/2010/main">
+                <a:solidFill>
+                  <a:srgbClr val="FFFFFF"/>
+                </a:solidFill>
+              </a14:hiddenFill>
+            </a:ext>
+          </a:extLst>
+        </p:spPr>
+        <p:txBody>
+          <a:bodyPr vert="horz" wrap="square" lIns="91440" tIns="45720" rIns="91440" bIns="45720" numCol="1" anchor="t" anchorCtr="0" compatLnSpc="1">
+            <a:prstTxWarp prst="textNoShape">
+              <a:avLst/>
+            </a:prstTxWarp>
+          </a:bodyPr>
+          <a:lstStyle/>
+          <a:p>
+            <a:endParaRPr lang="en-US"/>
+          </a:p>
+        </p:txBody>
+      </p:sp>
+      <p:pic>
+        <p:nvPicPr>
+          <p:cNvPr id="1028" name="Picture 4" descr="Simple anchor by bogdanco">
+            <a:extLst>
+              <a:ext uri="{FF2B5EF4-FFF2-40B4-BE49-F238E27FC236}">
+                <a16:creationId xmlns:a16="http://schemas.microsoft.com/office/drawing/2014/main" id="{910BB374-93EC-4C25-9121-61DD5DEBB55C}"/>
+              </a:ext>
+            </a:extLst>
+          </p:cNvPr>
+          <p:cNvPicPr>
+            <a:picLocks noChangeAspect="1" noChangeArrowheads="1"/>
+          </p:cNvPicPr>
+          <p:nvPr/>
+        </p:nvPicPr>
+        <p:blipFill>
+          <a:blip r:embed="rId2">
+            <a:extLst>
+              <a:ext uri="{28A0092B-C50C-407E-A947-70E740481C1C}">
+                <a14:useLocalDpi xmlns:a14="http://schemas.microsoft.com/office/drawing/2010/main" val="0"/>
+              </a:ext>
+            </a:extLst>
+          </a:blip>
+          <a:srcRect/>
+          <a:stretch>
+            <a:fillRect/>
+          </a:stretch>
+        </p:blipFill>
+        <p:spPr bwMode="auto">
+          <a:xfrm>
+            <a:off x="1113182" y="1030357"/>
+            <a:ext cx="1324113" cy="1639956"/>
+          </a:xfrm>
+          <a:prstGeom prst="rect">
+            <a:avLst/>
+          </a:prstGeom>
+          <a:noFill/>
+          <a:extLst>
+            <a:ext uri="{909E8E84-426E-40DD-AFC4-6F175D3DCCD1}">
+              <a14:hiddenFill xmlns:a14="http://schemas.microsoft.com/office/drawing/2010/main">
+                <a:solidFill>
+                  <a:srgbClr val="FFFFFF"/>
+                </a:solidFill>
+              </a14:hiddenFill>
+            </a:ext>
+          </a:extLst>
+        </p:spPr>
+      </p:pic>
+      <p:sp>
+        <p:nvSpPr>
+          <p:cNvPr id="2" name="TextBox 1">
+            <a:extLst>
+              <a:ext uri="{FF2B5EF4-FFF2-40B4-BE49-F238E27FC236}">
+                <a16:creationId xmlns:a16="http://schemas.microsoft.com/office/drawing/2014/main" id="{D2F6DB67-5FEE-4C0E-AB13-AFC078CE4025}"/>
+              </a:ext>
+            </a:extLst>
+          </p:cNvPr>
+          <p:cNvSpPr txBox="1"/>
+          <p:nvPr/>
+        </p:nvSpPr>
+        <p:spPr>
+          <a:xfrm>
+            <a:off x="1036320" y="487680"/>
+            <a:ext cx="1602377" cy="369332"/>
+          </a:xfrm>
+          <a:prstGeom prst="rect">
+            <a:avLst/>
+          </a:prstGeom>
+          <a:noFill/>
+        </p:spPr>
+        <p:txBody>
+          <a:bodyPr wrap="square" rtlCol="0">
+            <a:spAutoFit/>
+          </a:bodyPr>
+          <a:lstStyle/>
+          <a:p>
+            <a:r>
+              <a:rPr lang="en-US" dirty="0"/>
+              <a:t>Fix</a:t>
+            </a:r>
+          </a:p>
+        </p:txBody>
+      </p:sp>
+      <p:sp>
+        <p:nvSpPr>
+          <p:cNvPr id="5" name="TextBox 4">
+            <a:extLst>
+              <a:ext uri="{FF2B5EF4-FFF2-40B4-BE49-F238E27FC236}">
+                <a16:creationId xmlns:a16="http://schemas.microsoft.com/office/drawing/2014/main" id="{7C036617-4A27-4FC5-A748-50B7E9B3D059}"/>
+              </a:ext>
+            </a:extLst>
+          </p:cNvPr>
+          <p:cNvSpPr txBox="1"/>
+          <p:nvPr/>
+        </p:nvSpPr>
+        <p:spPr>
+          <a:xfrm>
+            <a:off x="4330491" y="487680"/>
+            <a:ext cx="1602377" cy="369332"/>
+          </a:xfrm>
+          <a:prstGeom prst="rect">
+            <a:avLst/>
+          </a:prstGeom>
+          <a:noFill/>
+        </p:spPr>
+        <p:txBody>
+          <a:bodyPr wrap="square" rtlCol="0">
+            <a:spAutoFit/>
+          </a:bodyPr>
+          <a:lstStyle/>
+          <a:p>
+            <a:r>
+              <a:rPr lang="en-US" dirty="0"/>
+              <a:t>Show Nodes</a:t>
+            </a:r>
+          </a:p>
+        </p:txBody>
+      </p:sp>
+      <p:sp>
+        <p:nvSpPr>
+          <p:cNvPr id="3" name="Flowchart: Decision 2">
+            <a:extLst>
+              <a:ext uri="{FF2B5EF4-FFF2-40B4-BE49-F238E27FC236}">
+                <a16:creationId xmlns:a16="http://schemas.microsoft.com/office/drawing/2014/main" id="{B1DD74D5-0EEA-499B-B9C9-BB9BA84F76C7}"/>
+              </a:ext>
+            </a:extLst>
+          </p:cNvPr>
+          <p:cNvSpPr>
+            <a:spLocks noChangeAspect="1"/>
+          </p:cNvSpPr>
+          <p:nvPr/>
+        </p:nvSpPr>
+        <p:spPr>
+          <a:xfrm>
+            <a:off x="4693920" y="1384663"/>
+            <a:ext cx="430973" cy="430973"/>
+          </a:xfrm>
+          <a:prstGeom prst="flowChartDecision">
+            <a:avLst/>
+          </a:prstGeom>
+          <a:solidFill>
+            <a:srgbClr val="C00000"/>
+          </a:solidFill>
+          <a:ln>
+            <a:solidFill>
+              <a:schemeClr val="tx1"/>
+            </a:solidFill>
+          </a:ln>
+        </p:spPr>
+        <p:style>
+          <a:lnRef idx="2">
+            <a:schemeClr val="accent1">
+              <a:shade val="50000"/>
+            </a:schemeClr>
+          </a:lnRef>
+          <a:fillRef idx="1">
+            <a:schemeClr val="accent1"/>
+          </a:fillRef>
+          <a:effectRef idx="0">
+            <a:schemeClr val="accent1"/>
+          </a:effectRef>
+          <a:fontRef idx="minor">
+            <a:schemeClr val="lt1"/>
+          </a:fontRef>
+        </p:style>
+        <p:txBody>
+          <a:bodyPr rtlCol="0" anchor="ctr"/>
+          <a:lstStyle/>
+          <a:p>
+            <a:pPr algn="ctr"/>
+            <a:endParaRPr lang="en-US"/>
+          </a:p>
+        </p:txBody>
+      </p:sp>
+      <p:sp>
+        <p:nvSpPr>
+          <p:cNvPr id="7" name="Flowchart: Decision 6">
+            <a:extLst>
+              <a:ext uri="{FF2B5EF4-FFF2-40B4-BE49-F238E27FC236}">
+                <a16:creationId xmlns:a16="http://schemas.microsoft.com/office/drawing/2014/main" id="{8D7F32AB-D259-4AD8-8EBC-54BB7461A6BD}"/>
+              </a:ext>
+            </a:extLst>
+          </p:cNvPr>
+          <p:cNvSpPr>
+            <a:spLocks noChangeAspect="1"/>
+          </p:cNvSpPr>
+          <p:nvPr/>
+        </p:nvSpPr>
+        <p:spPr>
+          <a:xfrm>
+            <a:off x="4791262" y="1482005"/>
+            <a:ext cx="228808" cy="228808"/>
+          </a:xfrm>
+          <a:prstGeom prst="flowChartDecision">
+            <a:avLst/>
+          </a:prstGeom>
+          <a:solidFill>
+            <a:schemeClr val="bg1"/>
+          </a:solidFill>
+          <a:ln>
+            <a:solidFill>
+              <a:schemeClr val="tx1"/>
+            </a:solidFill>
+          </a:ln>
+        </p:spPr>
+        <p:style>
+          <a:lnRef idx="2">
+            <a:schemeClr val="accent1">
+              <a:shade val="50000"/>
+            </a:schemeClr>
+          </a:lnRef>
+          <a:fillRef idx="1">
+            <a:schemeClr val="accent1"/>
+          </a:fillRef>
+          <a:effectRef idx="0">
+            <a:schemeClr val="accent1"/>
+          </a:effectRef>
+          <a:fontRef idx="minor">
+            <a:schemeClr val="lt1"/>
+          </a:fontRef>
+        </p:style>
+        <p:txBody>
+          <a:bodyPr rtlCol="0" anchor="ctr"/>
+          <a:lstStyle/>
+          <a:p>
+            <a:pPr algn="ctr"/>
+            <a:endParaRPr lang="en-US" baseline="-25000" dirty="0"/>
+          </a:p>
+        </p:txBody>
+      </p:sp>
+    </p:spTree>
+    <p:extLst>
+      <p:ext uri="{BB962C8B-B14F-4D97-AF65-F5344CB8AC3E}">
+        <p14:creationId xmlns:p14="http://schemas.microsoft.com/office/powerpoint/2010/main" val="679814669"/>
+      </p:ext>
+    </p:extLst>
+  </p:cSld>
+  <p:clrMapOvr>
+    <a:masterClrMapping/>
+  </p:clrMapOvr>
+</p:sld>
+</file>
+
 <file path=ppt/theme/theme1.xml><?xml version="1.0" encoding="utf-8"?>
 <a:theme xmlns:a="http://schemas.openxmlformats.org/drawingml/2006/main" name="Office Theme">
   <a:themeElements>

</xml_diff>

<commit_message>
adding about image removal of old pyqt4 code
</commit_message>
<xml_diff>
--- a/pyNastran/gui/icons/pics.pptx
+++ b/pyNastran/gui/icons/pics.pptx
@@ -8,6 +8,7 @@
     <p:sldId id="256" r:id="rId2"/>
     <p:sldId id="257" r:id="rId3"/>
     <p:sldId id="258" r:id="rId4"/>
+    <p:sldId id="259" r:id="rId5"/>
   </p:sldIdLst>
   <p:sldSz cx="12192000" cy="6858000"/>
   <p:notesSz cx="6858000" cy="9144000"/>
@@ -261,7 +262,7 @@
           <a:p>
             <a:fld id="{E392C192-A0AD-4860-9CF5-58BF5FDD6DBB}" type="datetimeFigureOut">
               <a:rPr lang="en-US" smtClean="0"/>
-              <a:t>11/10/2018</a:t>
+              <a:t>3/22/2020</a:t>
             </a:fld>
             <a:endParaRPr lang="en-US"/>
           </a:p>
@@ -459,7 +460,7 @@
           <a:p>
             <a:fld id="{E392C192-A0AD-4860-9CF5-58BF5FDD6DBB}" type="datetimeFigureOut">
               <a:rPr lang="en-US" smtClean="0"/>
-              <a:t>11/10/2018</a:t>
+              <a:t>3/22/2020</a:t>
             </a:fld>
             <a:endParaRPr lang="en-US"/>
           </a:p>
@@ -667,7 +668,7 @@
           <a:p>
             <a:fld id="{E392C192-A0AD-4860-9CF5-58BF5FDD6DBB}" type="datetimeFigureOut">
               <a:rPr lang="en-US" smtClean="0"/>
-              <a:t>11/10/2018</a:t>
+              <a:t>3/22/2020</a:t>
             </a:fld>
             <a:endParaRPr lang="en-US"/>
           </a:p>
@@ -865,7 +866,7 @@
           <a:p>
             <a:fld id="{E392C192-A0AD-4860-9CF5-58BF5FDD6DBB}" type="datetimeFigureOut">
               <a:rPr lang="en-US" smtClean="0"/>
-              <a:t>11/10/2018</a:t>
+              <a:t>3/22/2020</a:t>
             </a:fld>
             <a:endParaRPr lang="en-US"/>
           </a:p>
@@ -1140,7 +1141,7 @@
           <a:p>
             <a:fld id="{E392C192-A0AD-4860-9CF5-58BF5FDD6DBB}" type="datetimeFigureOut">
               <a:rPr lang="en-US" smtClean="0"/>
-              <a:t>11/10/2018</a:t>
+              <a:t>3/22/2020</a:t>
             </a:fld>
             <a:endParaRPr lang="en-US"/>
           </a:p>
@@ -1405,7 +1406,7 @@
           <a:p>
             <a:fld id="{E392C192-A0AD-4860-9CF5-58BF5FDD6DBB}" type="datetimeFigureOut">
               <a:rPr lang="en-US" smtClean="0"/>
-              <a:t>11/10/2018</a:t>
+              <a:t>3/22/2020</a:t>
             </a:fld>
             <a:endParaRPr lang="en-US"/>
           </a:p>
@@ -1817,7 +1818,7 @@
           <a:p>
             <a:fld id="{E392C192-A0AD-4860-9CF5-58BF5FDD6DBB}" type="datetimeFigureOut">
               <a:rPr lang="en-US" smtClean="0"/>
-              <a:t>11/10/2018</a:t>
+              <a:t>3/22/2020</a:t>
             </a:fld>
             <a:endParaRPr lang="en-US"/>
           </a:p>
@@ -1958,7 +1959,7 @@
           <a:p>
             <a:fld id="{E392C192-A0AD-4860-9CF5-58BF5FDD6DBB}" type="datetimeFigureOut">
               <a:rPr lang="en-US" smtClean="0"/>
-              <a:t>11/10/2018</a:t>
+              <a:t>3/22/2020</a:t>
             </a:fld>
             <a:endParaRPr lang="en-US"/>
           </a:p>
@@ -2071,7 +2072,7 @@
           <a:p>
             <a:fld id="{E392C192-A0AD-4860-9CF5-58BF5FDD6DBB}" type="datetimeFigureOut">
               <a:rPr lang="en-US" smtClean="0"/>
-              <a:t>11/10/2018</a:t>
+              <a:t>3/22/2020</a:t>
             </a:fld>
             <a:endParaRPr lang="en-US"/>
           </a:p>
@@ -2382,7 +2383,7 @@
           <a:p>
             <a:fld id="{E392C192-A0AD-4860-9CF5-58BF5FDD6DBB}" type="datetimeFigureOut">
               <a:rPr lang="en-US" smtClean="0"/>
-              <a:t>11/10/2018</a:t>
+              <a:t>3/22/2020</a:t>
             </a:fld>
             <a:endParaRPr lang="en-US"/>
           </a:p>
@@ -2670,7 +2671,7 @@
           <a:p>
             <a:fld id="{E392C192-A0AD-4860-9CF5-58BF5FDD6DBB}" type="datetimeFigureOut">
               <a:rPr lang="en-US" smtClean="0"/>
-              <a:t>11/10/2018</a:t>
+              <a:t>3/22/2020</a:t>
             </a:fld>
             <a:endParaRPr lang="en-US"/>
           </a:p>
@@ -2911,7 +2912,7 @@
           <a:p>
             <a:fld id="{E392C192-A0AD-4860-9CF5-58BF5FDD6DBB}" type="datetimeFigureOut">
               <a:rPr lang="en-US" smtClean="0"/>
-              <a:t>11/10/2018</a:t>
+              <a:t>3/22/2020</a:t>
             </a:fld>
             <a:endParaRPr lang="en-US"/>
           </a:p>
@@ -5335,6 +5336,183 @@
 </p:sld>
 </file>
 
+<file path=ppt/slides/slide4.xml><?xml version="1.0" encoding="utf-8"?>
+<p:sld xmlns:a="http://schemas.openxmlformats.org/drawingml/2006/main" xmlns:r="http://schemas.openxmlformats.org/officeDocument/2006/relationships" xmlns:p="http://schemas.openxmlformats.org/presentationml/2006/main">
+  <p:cSld>
+    <p:spTree>
+      <p:nvGrpSpPr>
+        <p:cNvPr id="1" name=""/>
+        <p:cNvGrpSpPr/>
+        <p:nvPr/>
+      </p:nvGrpSpPr>
+      <p:grpSpPr>
+        <a:xfrm>
+          <a:off x="0" y="0"/>
+          <a:ext cx="0" cy="0"/>
+          <a:chOff x="0" y="0"/>
+          <a:chExt cx="0" cy="0"/>
+        </a:xfrm>
+      </p:grpSpPr>
+      <p:grpSp>
+        <p:nvGrpSpPr>
+          <p:cNvPr id="7" name="Group 6">
+            <a:extLst>
+              <a:ext uri="{FF2B5EF4-FFF2-40B4-BE49-F238E27FC236}">
+                <a16:creationId xmlns:a16="http://schemas.microsoft.com/office/drawing/2014/main" id="{B3FC484E-5F1E-4878-A7AB-D7972F672B49}"/>
+              </a:ext>
+            </a:extLst>
+          </p:cNvPr>
+          <p:cNvGrpSpPr/>
+          <p:nvPr/>
+        </p:nvGrpSpPr>
+        <p:grpSpPr>
+          <a:xfrm>
+            <a:off x="1828800" y="768973"/>
+            <a:ext cx="5925787" cy="1264380"/>
+            <a:chOff x="1828800" y="768973"/>
+            <a:chExt cx="5925787" cy="1264380"/>
+          </a:xfrm>
+        </p:grpSpPr>
+        <p:pic>
+          <p:nvPicPr>
+            <p:cNvPr id="5" name="Picture 4">
+              <a:extLst>
+                <a:ext uri="{FF2B5EF4-FFF2-40B4-BE49-F238E27FC236}">
+                  <a16:creationId xmlns:a16="http://schemas.microsoft.com/office/drawing/2014/main" id="{A7F4EF67-3656-446A-842E-93048C58F14C}"/>
+                </a:ext>
+              </a:extLst>
+            </p:cNvPr>
+            <p:cNvPicPr>
+              <a:picLocks noChangeAspect="1"/>
+            </p:cNvPicPr>
+            <p:nvPr/>
+          </p:nvPicPr>
+          <p:blipFill rotWithShape="1">
+            <a:blip r:embed="rId2">
+              <a:extLst>
+                <a:ext uri="{28A0092B-C50C-407E-A947-70E740481C1C}">
+                  <a14:useLocalDpi xmlns:a14="http://schemas.microsoft.com/office/drawing/2010/main" val="0"/>
+                </a:ext>
+              </a:extLst>
+            </a:blip>
+            <a:srcRect l="9665" t="30153" r="40116" b="51410"/>
+            <a:stretch/>
+          </p:blipFill>
+          <p:spPr>
+            <a:xfrm>
+              <a:off x="1828800" y="768973"/>
+              <a:ext cx="5925787" cy="1264380"/>
+            </a:xfrm>
+            <a:prstGeom prst="rect">
+              <a:avLst/>
+            </a:prstGeom>
+            <a:scene3d>
+              <a:camera prst="orthographicFront"/>
+              <a:lightRig rig="threePt" dir="t"/>
+            </a:scene3d>
+            <a:sp3d>
+              <a:bevelT/>
+            </a:sp3d>
+          </p:spPr>
+        </p:pic>
+        <p:sp>
+          <p:nvSpPr>
+            <p:cNvPr id="6" name="TextBox 5">
+              <a:extLst>
+                <a:ext uri="{FF2B5EF4-FFF2-40B4-BE49-F238E27FC236}">
+                  <a16:creationId xmlns:a16="http://schemas.microsoft.com/office/drawing/2014/main" id="{C2323A29-35F4-41E5-B3D0-1C344646D19E}"/>
+                </a:ext>
+              </a:extLst>
+            </p:cNvPr>
+            <p:cNvSpPr txBox="1"/>
+            <p:nvPr/>
+          </p:nvSpPr>
+          <p:spPr>
+            <a:xfrm>
+              <a:off x="1828800" y="1113359"/>
+              <a:ext cx="5925787" cy="646331"/>
+            </a:xfrm>
+            <a:prstGeom prst="rect">
+              <a:avLst/>
+            </a:prstGeom>
+            <a:noFill/>
+            <a:effectLst>
+              <a:glow>
+                <a:schemeClr val="accent1">
+                  <a:alpha val="40000"/>
+                </a:schemeClr>
+              </a:glow>
+              <a:outerShdw blurRad="50800" dist="50800" dir="5400000" sx="1000" sy="1000" algn="ctr" rotWithShape="0">
+                <a:srgbClr val="000000">
+                  <a:alpha val="43137"/>
+                </a:srgbClr>
+              </a:outerShdw>
+            </a:effectLst>
+            <a:scene3d>
+              <a:camera prst="orthographicFront"/>
+              <a:lightRig rig="threePt" dir="t"/>
+            </a:scene3d>
+            <a:sp3d>
+              <a:bevelT/>
+            </a:sp3d>
+          </p:spPr>
+          <p:txBody>
+            <a:bodyPr wrap="square" rtlCol="0">
+              <a:spAutoFit/>
+            </a:bodyPr>
+            <a:lstStyle/>
+            <a:p>
+              <a:pPr algn="ctr"/>
+              <a:r>
+                <a:rPr lang="en-US" sz="3600" i="1" dirty="0" err="1">
+                  <a:ln w="15875">
+                    <a:solidFill>
+                      <a:schemeClr val="bg2"/>
+                    </a:solidFill>
+                  </a:ln>
+                  <a:effectLst>
+                    <a:outerShdw blurRad="50800" dist="50800" dir="5400000" algn="ctr" rotWithShape="0">
+                      <a:schemeClr val="bg2">
+                        <a:lumMod val="75000"/>
+                      </a:schemeClr>
+                    </a:outerShdw>
+                  </a:effectLst>
+                  <a:latin typeface="Tw Cen MT Condensed Extra Bold" panose="020B0803020202020204" pitchFamily="34" charset="0"/>
+                </a:rPr>
+                <a:t>pyNastran</a:t>
+              </a:r>
+              <a:endParaRPr lang="en-US" sz="3600" i="1" dirty="0">
+                <a:ln w="15875">
+                  <a:solidFill>
+                    <a:schemeClr val="bg2"/>
+                  </a:solidFill>
+                </a:ln>
+                <a:effectLst>
+                  <a:outerShdw blurRad="50800" dist="50800" dir="5400000" algn="ctr" rotWithShape="0">
+                    <a:schemeClr val="bg2">
+                      <a:lumMod val="75000"/>
+                    </a:schemeClr>
+                  </a:outerShdw>
+                </a:effectLst>
+                <a:latin typeface="Tw Cen MT Condensed Extra Bold" panose="020B0803020202020204" pitchFamily="34" charset="0"/>
+              </a:endParaRPr>
+            </a:p>
+          </p:txBody>
+        </p:sp>
+      </p:grpSp>
+    </p:spTree>
+    <p:extLst>
+      <p:ext uri="{BB962C8B-B14F-4D97-AF65-F5344CB8AC3E}">
+        <p14:creationId xmlns:p14="http://schemas.microsoft.com/office/powerpoint/2010/main" val="3993269164"/>
+      </p:ext>
+    </p:extLst>
+  </p:cSld>
+  <p:clrMapOvr>
+    <a:masterClrMapping/>
+  </p:clrMapOvr>
+</p:sld>
+</file>
+
 <file path=ppt/theme/theme1.xml><?xml version="1.0" encoding="utf-8"?>
 <a:theme xmlns:a="http://schemas.openxmlformats.org/drawingml/2006/main" name="Office Theme">
   <a:themeElements>

</xml_diff>